<commit_message>
Redesigned app to use reactive variables
</commit_message>
<xml_diff>
--- a/doc/format_data/format_data.pptx
+++ b/doc/format_data/format_data.pptx
@@ -245,7 +245,7 @@
           <a:p>
             <a:fld id="{C07DDC09-5492-42AF-9332-02F3C0E5AFD8}" type="datetimeFigureOut">
               <a:rPr lang="en-US" smtClean="0"/>
-              <a:t>6/13/2018</a:t>
+              <a:t>6/19/2018</a:t>
             </a:fld>
             <a:endParaRPr lang="en-US"/>
           </a:p>
@@ -415,7 +415,7 @@
           <a:p>
             <a:fld id="{C07DDC09-5492-42AF-9332-02F3C0E5AFD8}" type="datetimeFigureOut">
               <a:rPr lang="en-US" smtClean="0"/>
-              <a:t>6/13/2018</a:t>
+              <a:t>6/19/2018</a:t>
             </a:fld>
             <a:endParaRPr lang="en-US"/>
           </a:p>
@@ -595,7 +595,7 @@
           <a:p>
             <a:fld id="{C07DDC09-5492-42AF-9332-02F3C0E5AFD8}" type="datetimeFigureOut">
               <a:rPr lang="en-US" smtClean="0"/>
-              <a:t>6/13/2018</a:t>
+              <a:t>6/19/2018</a:t>
             </a:fld>
             <a:endParaRPr lang="en-US"/>
           </a:p>
@@ -765,7 +765,7 @@
           <a:p>
             <a:fld id="{C07DDC09-5492-42AF-9332-02F3C0E5AFD8}" type="datetimeFigureOut">
               <a:rPr lang="en-US" smtClean="0"/>
-              <a:t>6/13/2018</a:t>
+              <a:t>6/19/2018</a:t>
             </a:fld>
             <a:endParaRPr lang="en-US"/>
           </a:p>
@@ -1011,7 +1011,7 @@
           <a:p>
             <a:fld id="{C07DDC09-5492-42AF-9332-02F3C0E5AFD8}" type="datetimeFigureOut">
               <a:rPr lang="en-US" smtClean="0"/>
-              <a:t>6/13/2018</a:t>
+              <a:t>6/19/2018</a:t>
             </a:fld>
             <a:endParaRPr lang="en-US"/>
           </a:p>
@@ -1243,7 +1243,7 @@
           <a:p>
             <a:fld id="{C07DDC09-5492-42AF-9332-02F3C0E5AFD8}" type="datetimeFigureOut">
               <a:rPr lang="en-US" smtClean="0"/>
-              <a:t>6/13/2018</a:t>
+              <a:t>6/19/2018</a:t>
             </a:fld>
             <a:endParaRPr lang="en-US"/>
           </a:p>
@@ -1610,7 +1610,7 @@
           <a:p>
             <a:fld id="{C07DDC09-5492-42AF-9332-02F3C0E5AFD8}" type="datetimeFigureOut">
               <a:rPr lang="en-US" smtClean="0"/>
-              <a:t>6/13/2018</a:t>
+              <a:t>6/19/2018</a:t>
             </a:fld>
             <a:endParaRPr lang="en-US"/>
           </a:p>
@@ -1728,7 +1728,7 @@
           <a:p>
             <a:fld id="{C07DDC09-5492-42AF-9332-02F3C0E5AFD8}" type="datetimeFigureOut">
               <a:rPr lang="en-US" smtClean="0"/>
-              <a:t>6/13/2018</a:t>
+              <a:t>6/19/2018</a:t>
             </a:fld>
             <a:endParaRPr lang="en-US"/>
           </a:p>
@@ -1823,7 +1823,7 @@
           <a:p>
             <a:fld id="{C07DDC09-5492-42AF-9332-02F3C0E5AFD8}" type="datetimeFigureOut">
               <a:rPr lang="en-US" smtClean="0"/>
-              <a:t>6/13/2018</a:t>
+              <a:t>6/19/2018</a:t>
             </a:fld>
             <a:endParaRPr lang="en-US"/>
           </a:p>
@@ -2100,7 +2100,7 @@
           <a:p>
             <a:fld id="{C07DDC09-5492-42AF-9332-02F3C0E5AFD8}" type="datetimeFigureOut">
               <a:rPr lang="en-US" smtClean="0"/>
-              <a:t>6/13/2018</a:t>
+              <a:t>6/19/2018</a:t>
             </a:fld>
             <a:endParaRPr lang="en-US"/>
           </a:p>
@@ -2353,7 +2353,7 @@
           <a:p>
             <a:fld id="{C07DDC09-5492-42AF-9332-02F3C0E5AFD8}" type="datetimeFigureOut">
               <a:rPr lang="en-US" smtClean="0"/>
-              <a:t>6/13/2018</a:t>
+              <a:t>6/19/2018</a:t>
             </a:fld>
             <a:endParaRPr lang="en-US"/>
           </a:p>
@@ -2566,7 +2566,7 @@
           <a:p>
             <a:fld id="{C07DDC09-5492-42AF-9332-02F3C0E5AFD8}" type="datetimeFigureOut">
               <a:rPr lang="en-US" smtClean="0"/>
-              <a:t>6/13/2018</a:t>
+              <a:t>6/19/2018</a:t>
             </a:fld>
             <a:endParaRPr lang="en-US"/>
           </a:p>
@@ -5096,269 +5096,6 @@
       </p:grpSp>
       <p:sp>
         <p:nvSpPr>
-          <p:cNvPr id="7" name="Rectangle 6"/>
-          <p:cNvSpPr/>
-          <p:nvPr/>
-        </p:nvSpPr>
-        <p:spPr>
-          <a:xfrm>
-            <a:off x="11838280" y="58383"/>
-            <a:ext cx="1422063" cy="1277380"/>
-          </a:xfrm>
-          <a:prstGeom prst="rect">
-            <a:avLst/>
-          </a:prstGeom>
-        </p:spPr>
-        <p:style>
-          <a:lnRef idx="2">
-            <a:schemeClr val="dk1"/>
-          </a:lnRef>
-          <a:fillRef idx="1">
-            <a:schemeClr val="lt1"/>
-          </a:fillRef>
-          <a:effectRef idx="0">
-            <a:schemeClr val="dk1"/>
-          </a:effectRef>
-          <a:fontRef idx="minor">
-            <a:schemeClr val="dk1"/>
-          </a:fontRef>
-        </p:style>
-        <p:txBody>
-          <a:bodyPr rtlCol="0" anchor="ctr"/>
-          <a:lstStyle/>
-          <a:p>
-            <a:pPr algn="ctr"/>
-            <a:endParaRPr lang="en-US"/>
-          </a:p>
-        </p:txBody>
-      </p:sp>
-      <p:grpSp>
-        <p:nvGrpSpPr>
-          <p:cNvPr id="8" name="Group 7"/>
-          <p:cNvGrpSpPr/>
-          <p:nvPr/>
-        </p:nvGrpSpPr>
-        <p:grpSpPr>
-          <a:xfrm>
-            <a:off x="11910614" y="440057"/>
-            <a:ext cx="1369221" cy="744047"/>
-            <a:chOff x="610814" y="413250"/>
-            <a:chExt cx="1874300" cy="841490"/>
-          </a:xfrm>
-        </p:grpSpPr>
-        <p:sp>
-          <p:nvSpPr>
-            <p:cNvPr id="9" name="Rectangle 8"/>
-            <p:cNvSpPr/>
-            <p:nvPr/>
-          </p:nvSpPr>
-          <p:spPr>
-            <a:xfrm>
-              <a:off x="610814" y="426720"/>
-              <a:ext cx="304800" cy="301752"/>
-            </a:xfrm>
-            <a:prstGeom prst="rect">
-              <a:avLst/>
-            </a:prstGeom>
-            <a:solidFill>
-              <a:srgbClr val="FF0000"/>
-            </a:solidFill>
-            <a:ln>
-              <a:solidFill>
-                <a:schemeClr val="bg1"/>
-              </a:solidFill>
-            </a:ln>
-          </p:spPr>
-          <p:style>
-            <a:lnRef idx="2">
-              <a:schemeClr val="accent1">
-                <a:shade val="50000"/>
-              </a:schemeClr>
-            </a:lnRef>
-            <a:fillRef idx="1">
-              <a:schemeClr val="accent1"/>
-            </a:fillRef>
-            <a:effectRef idx="0">
-              <a:schemeClr val="accent1"/>
-            </a:effectRef>
-            <a:fontRef idx="minor">
-              <a:schemeClr val="lt1"/>
-            </a:fontRef>
-          </p:style>
-          <p:txBody>
-            <a:bodyPr rtlCol="0" anchor="ctr"/>
-            <a:lstStyle/>
-            <a:p>
-              <a:pPr algn="ctr"/>
-              <a:endParaRPr lang="en-US"/>
-            </a:p>
-          </p:txBody>
-        </p:sp>
-        <p:sp>
-          <p:nvSpPr>
-            <p:cNvPr id="10" name="TextBox 9"/>
-            <p:cNvSpPr txBox="1"/>
-            <p:nvPr/>
-          </p:nvSpPr>
-          <p:spPr>
-            <a:xfrm>
-              <a:off x="680720" y="413250"/>
-              <a:ext cx="1804394" cy="338554"/>
-            </a:xfrm>
-            <a:prstGeom prst="rect">
-              <a:avLst/>
-            </a:prstGeom>
-            <a:noFill/>
-            <a:ln>
-              <a:noFill/>
-            </a:ln>
-          </p:spPr>
-          <p:txBody>
-            <a:bodyPr wrap="square" rtlCol="0">
-              <a:spAutoFit/>
-            </a:bodyPr>
-            <a:lstStyle/>
-            <a:p>
-              <a:pPr algn="ctr"/>
-              <a:r>
-                <a:rPr lang="en-US" sz="1600" dirty="0" smtClean="0">
-                  <a:latin typeface="Consolas" panose="020B0609020204030204" pitchFamily="49" charset="0"/>
-                </a:rPr>
-                <a:t>Variable</a:t>
-              </a:r>
-              <a:endParaRPr lang="en-US" dirty="0">
-                <a:latin typeface="Consolas" panose="020B0609020204030204" pitchFamily="49" charset="0"/>
-              </a:endParaRPr>
-            </a:p>
-          </p:txBody>
-        </p:sp>
-        <p:sp>
-          <p:nvSpPr>
-            <p:cNvPr id="11" name="Rectangle 10"/>
-            <p:cNvSpPr/>
-            <p:nvPr/>
-          </p:nvSpPr>
-          <p:spPr>
-            <a:xfrm>
-              <a:off x="610814" y="929656"/>
-              <a:ext cx="304800" cy="301752"/>
-            </a:xfrm>
-            <a:prstGeom prst="rect">
-              <a:avLst/>
-            </a:prstGeom>
-            <a:solidFill>
-              <a:schemeClr val="tx1"/>
-            </a:solidFill>
-            <a:ln>
-              <a:solidFill>
-                <a:schemeClr val="bg1"/>
-              </a:solidFill>
-            </a:ln>
-          </p:spPr>
-          <p:style>
-            <a:lnRef idx="2">
-              <a:schemeClr val="accent1">
-                <a:shade val="50000"/>
-              </a:schemeClr>
-            </a:lnRef>
-            <a:fillRef idx="1">
-              <a:schemeClr val="accent1"/>
-            </a:fillRef>
-            <a:effectRef idx="0">
-              <a:schemeClr val="accent1"/>
-            </a:effectRef>
-            <a:fontRef idx="minor">
-              <a:schemeClr val="lt1"/>
-            </a:fontRef>
-          </p:style>
-          <p:txBody>
-            <a:bodyPr rtlCol="0" anchor="ctr"/>
-            <a:lstStyle/>
-            <a:p>
-              <a:pPr algn="ctr"/>
-              <a:endParaRPr lang="en-US"/>
-            </a:p>
-          </p:txBody>
-        </p:sp>
-        <p:sp>
-          <p:nvSpPr>
-            <p:cNvPr id="12" name="TextBox 11"/>
-            <p:cNvSpPr txBox="1"/>
-            <p:nvPr/>
-          </p:nvSpPr>
-          <p:spPr>
-            <a:xfrm>
-              <a:off x="680720" y="916186"/>
-              <a:ext cx="1804394" cy="338554"/>
-            </a:xfrm>
-            <a:prstGeom prst="rect">
-              <a:avLst/>
-            </a:prstGeom>
-            <a:noFill/>
-            <a:ln>
-              <a:noFill/>
-            </a:ln>
-          </p:spPr>
-          <p:txBody>
-            <a:bodyPr wrap="square" rtlCol="0">
-              <a:spAutoFit/>
-            </a:bodyPr>
-            <a:lstStyle/>
-            <a:p>
-              <a:pPr algn="ctr"/>
-              <a:r>
-                <a:rPr lang="en-US" sz="1600" dirty="0" smtClean="0">
-                  <a:latin typeface="Consolas" panose="020B0609020204030204" pitchFamily="49" charset="0"/>
-                </a:rPr>
-                <a:t>Constant</a:t>
-              </a:r>
-              <a:endParaRPr lang="en-US" dirty="0">
-                <a:latin typeface="Consolas" panose="020B0609020204030204" pitchFamily="49" charset="0"/>
-              </a:endParaRPr>
-            </a:p>
-          </p:txBody>
-        </p:sp>
-      </p:grpSp>
-      <p:sp>
-        <p:nvSpPr>
-          <p:cNvPr id="13" name="TextBox 12"/>
-          <p:cNvSpPr txBox="1"/>
-          <p:nvPr/>
-        </p:nvSpPr>
-        <p:spPr>
-          <a:xfrm>
-            <a:off x="11983977" y="58383"/>
-            <a:ext cx="1130667" cy="369332"/>
-          </a:xfrm>
-          <a:prstGeom prst="rect">
-            <a:avLst/>
-          </a:prstGeom>
-          <a:noFill/>
-          <a:ln>
-            <a:noFill/>
-          </a:ln>
-        </p:spPr>
-        <p:txBody>
-          <a:bodyPr wrap="square" rtlCol="0">
-            <a:spAutoFit/>
-          </a:bodyPr>
-          <a:lstStyle/>
-          <a:p>
-            <a:pPr algn="ctr"/>
-            <a:r>
-              <a:rPr lang="en-US" b="1" u="sng" dirty="0" smtClean="0">
-                <a:latin typeface="Consolas" panose="020B0609020204030204" pitchFamily="49" charset="0"/>
-              </a:rPr>
-              <a:t>Legend</a:t>
-            </a:r>
-            <a:endParaRPr lang="en-US" b="1" u="sng" dirty="0">
-              <a:latin typeface="Consolas" panose="020B0609020204030204" pitchFamily="49" charset="0"/>
-            </a:endParaRPr>
-          </a:p>
-        </p:txBody>
-      </p:sp>
-      <p:sp>
-        <p:nvSpPr>
           <p:cNvPr id="14" name="TextBox 13"/>
           <p:cNvSpPr txBox="1"/>
           <p:nvPr/>
@@ -5393,13 +5130,7 @@
               <a:rPr lang="en-US" sz="1200" dirty="0" smtClean="0">
                 <a:latin typeface="Consolas" panose="020B0609020204030204" pitchFamily="49" charset="0"/>
               </a:rPr>
-              <a:t> </a:t>
-            </a:r>
-            <a:r>
-              <a:rPr lang="en-US" sz="1200" dirty="0" smtClean="0">
-                <a:latin typeface="Consolas" panose="020B0609020204030204" pitchFamily="49" charset="0"/>
-              </a:rPr>
-              <a:t>“SQL </a:t>
+              <a:t> “SQL </a:t>
             </a:r>
             <a:r>
               <a:rPr lang="en-US" sz="1200" dirty="0" err="1" smtClean="0">
@@ -5413,9 +5144,6 @@
               </a:rPr>
               <a:t>”</a:t>
             </a:r>
-            <a:endParaRPr lang="en-US" sz="1200" dirty="0" smtClean="0">
-              <a:latin typeface="Consolas" panose="020B0609020204030204" pitchFamily="49" charset="0"/>
-            </a:endParaRPr>
           </a:p>
           <a:p>
             <a:pPr algn="ctr"/>
@@ -5585,13 +5313,7 @@
               <a:rPr lang="en-US" sz="1200" dirty="0" smtClean="0">
                 <a:latin typeface="Consolas" panose="020B0609020204030204" pitchFamily="49" charset="0"/>
               </a:rPr>
-              <a:t>User Input</a:t>
-            </a:r>
-            <a:r>
-              <a:rPr lang="en-US" sz="1200" dirty="0" smtClean="0">
-                <a:latin typeface="Consolas" panose="020B0609020204030204" pitchFamily="49" charset="0"/>
-              </a:rPr>
-              <a:t>:</a:t>
+              <a:t>User Input:</a:t>
             </a:r>
           </a:p>
           <a:p>
@@ -6276,13 +5998,7 @@
               <a:rPr lang="en-US" sz="1200" dirty="0" err="1" smtClean="0">
                 <a:latin typeface="Consolas" panose="020B0609020204030204" pitchFamily="49" charset="0"/>
               </a:rPr>
-              <a:t>d</a:t>
-            </a:r>
-            <a:r>
-              <a:rPr lang="en-US" sz="1200" dirty="0" err="1" smtClean="0">
-                <a:latin typeface="Consolas" panose="020B0609020204030204" pitchFamily="49" charset="0"/>
-              </a:rPr>
-              <a:t>atatables</a:t>
+              <a:t>datatables</a:t>
             </a:r>
             <a:endParaRPr lang="en-US" sz="1200" dirty="0">
               <a:latin typeface="Consolas" panose="020B0609020204030204" pitchFamily="49" charset="0"/>
@@ -6481,9 +6197,6 @@
               </a:rPr>
               <a:t> with SQL Data”</a:t>
             </a:r>
-            <a:endParaRPr lang="en-US" sz="1200" dirty="0" smtClean="0">
-              <a:latin typeface="Consolas" panose="020B0609020204030204" pitchFamily="49" charset="0"/>
-            </a:endParaRPr>
           </a:p>
           <a:p>
             <a:pPr algn="ctr"/>
@@ -6574,10 +6287,10 @@
   <a:themeElements>
     <a:clrScheme name="Office">
       <a:dk1>
-        <a:sysClr val="windowText" lastClr="000000"/>
+        <a:sysClr val="windowText" lastClr="00FF00"/>
       </a:dk1>
       <a:lt1>
-        <a:sysClr val="window" lastClr="FFFFFF"/>
+        <a:sysClr val="window" lastClr="000000"/>
       </a:lt1>
       <a:dk2>
         <a:srgbClr val="44546A"/>

</xml_diff>